<commit_message>
fixed bug that cauased empty list items to show up and added support for double strikethrough
</commit_message>
<xml_diff>
--- a/PowerPointParser/PowerPointParserTests/TestData/SpecialCharacters.pptx
+++ b/PowerPointParser/PowerPointParserTests/TestData/SpecialCharacters.pptx
@@ -210,7 +210,7 @@
           <a:p>
             <a:fld id="{3CCCA4E1-BC71-460A-B422-B388AB21C4C4}" type="datetimeFigureOut">
               <a:rPr lang="en-US" smtClean="0"/>
-              <a:t>7/20/2022</a:t>
+              <a:t>7/21/2022</a:t>
             </a:fld>
             <a:endParaRPr lang="en-US"/>
           </a:p>
@@ -1033,7 +1033,7 @@
           <a:p>
             <a:fld id="{54DBFB14-2A8F-46A6-BDF0-6350BDD606F1}" type="datetimeFigureOut">
               <a:rPr lang="en-US" smtClean="0"/>
-              <a:t>7/20/2022</a:t>
+              <a:t>7/21/2022</a:t>
             </a:fld>
             <a:endParaRPr lang="en-US"/>
           </a:p>
@@ -1231,7 +1231,7 @@
           <a:p>
             <a:fld id="{54DBFB14-2A8F-46A6-BDF0-6350BDD606F1}" type="datetimeFigureOut">
               <a:rPr lang="en-US" smtClean="0"/>
-              <a:t>7/20/2022</a:t>
+              <a:t>7/21/2022</a:t>
             </a:fld>
             <a:endParaRPr lang="en-US"/>
           </a:p>
@@ -1439,7 +1439,7 @@
           <a:p>
             <a:fld id="{54DBFB14-2A8F-46A6-BDF0-6350BDD606F1}" type="datetimeFigureOut">
               <a:rPr lang="en-US" smtClean="0"/>
-              <a:t>7/20/2022</a:t>
+              <a:t>7/21/2022</a:t>
             </a:fld>
             <a:endParaRPr lang="en-US"/>
           </a:p>
@@ -3257,7 +3257,7 @@
           <a:p>
             <a:fld id="{54DBFB14-2A8F-46A6-BDF0-6350BDD606F1}" type="datetimeFigureOut">
               <a:rPr lang="en-US" smtClean="0"/>
-              <a:t>7/20/2022</a:t>
+              <a:t>7/21/2022</a:t>
             </a:fld>
             <a:endParaRPr lang="en-US"/>
           </a:p>
@@ -3532,7 +3532,7 @@
           <a:p>
             <a:fld id="{54DBFB14-2A8F-46A6-BDF0-6350BDD606F1}" type="datetimeFigureOut">
               <a:rPr lang="en-US" smtClean="0"/>
-              <a:t>7/20/2022</a:t>
+              <a:t>7/21/2022</a:t>
             </a:fld>
             <a:endParaRPr lang="en-US"/>
           </a:p>
@@ -3797,7 +3797,7 @@
           <a:p>
             <a:fld id="{54DBFB14-2A8F-46A6-BDF0-6350BDD606F1}" type="datetimeFigureOut">
               <a:rPr lang="en-US" smtClean="0"/>
-              <a:t>7/20/2022</a:t>
+              <a:t>7/21/2022</a:t>
             </a:fld>
             <a:endParaRPr lang="en-US"/>
           </a:p>
@@ -4209,7 +4209,7 @@
           <a:p>
             <a:fld id="{54DBFB14-2A8F-46A6-BDF0-6350BDD606F1}" type="datetimeFigureOut">
               <a:rPr lang="en-US" smtClean="0"/>
-              <a:t>7/20/2022</a:t>
+              <a:t>7/21/2022</a:t>
             </a:fld>
             <a:endParaRPr lang="en-US"/>
           </a:p>
@@ -4350,7 +4350,7 @@
           <a:p>
             <a:fld id="{54DBFB14-2A8F-46A6-BDF0-6350BDD606F1}" type="datetimeFigureOut">
               <a:rPr lang="en-US" smtClean="0"/>
-              <a:t>7/20/2022</a:t>
+              <a:t>7/21/2022</a:t>
             </a:fld>
             <a:endParaRPr lang="en-US"/>
           </a:p>
@@ -4463,7 +4463,7 @@
           <a:p>
             <a:fld id="{54DBFB14-2A8F-46A6-BDF0-6350BDD606F1}" type="datetimeFigureOut">
               <a:rPr lang="en-US" smtClean="0"/>
-              <a:t>7/20/2022</a:t>
+              <a:t>7/21/2022</a:t>
             </a:fld>
             <a:endParaRPr lang="en-US"/>
           </a:p>
@@ -4774,7 +4774,7 @@
           <a:p>
             <a:fld id="{54DBFB14-2A8F-46A6-BDF0-6350BDD606F1}" type="datetimeFigureOut">
               <a:rPr lang="en-US" smtClean="0"/>
-              <a:t>7/20/2022</a:t>
+              <a:t>7/21/2022</a:t>
             </a:fld>
             <a:endParaRPr lang="en-US"/>
           </a:p>
@@ -5062,7 +5062,7 @@
           <a:p>
             <a:fld id="{54DBFB14-2A8F-46A6-BDF0-6350BDD606F1}" type="datetimeFigureOut">
               <a:rPr lang="en-US" smtClean="0"/>
-              <a:t>7/20/2022</a:t>
+              <a:t>7/21/2022</a:t>
             </a:fld>
             <a:endParaRPr lang="en-US"/>
           </a:p>
@@ -5303,7 +5303,7 @@
           <a:p>
             <a:fld id="{54DBFB14-2A8F-46A6-BDF0-6350BDD606F1}" type="datetimeFigureOut">
               <a:rPr lang="en-US" smtClean="0"/>
-              <a:t>7/20/2022</a:t>
+              <a:t>7/21/2022</a:t>
             </a:fld>
             <a:endParaRPr lang="en-US"/>
           </a:p>
@@ -6402,1702 +6402,6 @@
           <a:chExt cx="0" cy="0"/>
         </a:xfrm>
       </p:grpSpPr>
-      <p:sp>
-        <p:nvSpPr>
-          <p:cNvPr id="4" name="ZoneTexte 8">
-            <a:extLst>
-              <a:ext uri="{FF2B5EF4-FFF2-40B4-BE49-F238E27FC236}">
-                <a16:creationId xmlns:a16="http://schemas.microsoft.com/office/drawing/2014/main" id="{D344BCA8-9588-493D-B384-80359212FEA1}"/>
-              </a:ext>
-            </a:extLst>
-          </p:cNvPr>
-          <p:cNvSpPr txBox="1"/>
-          <p:nvPr/>
-        </p:nvSpPr>
-        <p:spPr>
-          <a:xfrm>
-            <a:off x="104354" y="646052"/>
-            <a:ext cx="5987973" cy="2554545"/>
-          </a:xfrm>
-          <a:prstGeom prst="rect">
-            <a:avLst/>
-          </a:prstGeom>
-          <a:noFill/>
-        </p:spPr>
-        <p:txBody>
-          <a:bodyPr wrap="square">
-            <a:spAutoFit/>
-          </a:bodyPr>
-          <a:lstStyle/>
-          <a:p>
-            <a:pPr marL="342900" marR="0" lvl="0" indent="-342900" algn="l" defTabSz="457200" rtl="0" eaLnBrk="1" fontAlgn="auto" latinLnBrk="0" hangingPunct="1">
-              <a:lnSpc>
-                <a:spcPct val="100000"/>
-              </a:lnSpc>
-              <a:spcBef>
-                <a:spcPts val="0"/>
-              </a:spcBef>
-              <a:spcAft>
-                <a:spcPts val="0"/>
-              </a:spcAft>
-              <a:buClrTx/>
-              <a:buSzTx/>
-              <a:buFontTx/>
-              <a:buChar char="-"/>
-              <a:tabLst/>
-              <a:defRPr/>
-            </a:pPr>
-            <a:r>
-              <a:rPr kumimoji="0" lang="fr-FR" sz="2000" b="1" i="0" u="none" strike="noStrike" kern="1200" cap="none" spc="0" normalizeH="0" baseline="0" noProof="0" dirty="0">
-                <a:ln>
-                  <a:noFill/>
-                </a:ln>
-                <a:solidFill>
-                  <a:prstClr val="black"/>
-                </a:solidFill>
-                <a:effectLst/>
-                <a:uLnTx/>
-                <a:uFillTx/>
-                <a:latin typeface="Arial"/>
-                <a:ea typeface="ＭＳ Ｐゴシック" charset="0"/>
-                <a:cs typeface="Arial"/>
-              </a:rPr>
-              <a:t>10 to 20 millions HTLV-I </a:t>
-            </a:r>
-            <a:r>
-              <a:rPr kumimoji="0" lang="fr-FR" sz="2000" b="1" i="0" u="none" strike="noStrike" kern="1200" cap="none" spc="0" normalizeH="0" baseline="0" noProof="0" dirty="0" err="1">
-                <a:ln>
-                  <a:noFill/>
-                </a:ln>
-                <a:solidFill>
-                  <a:prstClr val="black"/>
-                </a:solidFill>
-                <a:effectLst/>
-                <a:uLnTx/>
-                <a:uFillTx/>
-                <a:latin typeface="Arial"/>
-                <a:ea typeface="ＭＳ Ｐゴシック" charset="0"/>
-                <a:cs typeface="Arial"/>
-              </a:rPr>
-              <a:t>infected</a:t>
-            </a:r>
-            <a:r>
-              <a:rPr kumimoji="0" lang="fr-FR" sz="2000" b="1" i="0" u="none" strike="noStrike" kern="1200" cap="none" spc="0" normalizeH="0" baseline="0" noProof="0" dirty="0">
-                <a:ln>
-                  <a:noFill/>
-                </a:ln>
-                <a:solidFill>
-                  <a:prstClr val="black"/>
-                </a:solidFill>
-                <a:effectLst/>
-                <a:uLnTx/>
-                <a:uFillTx/>
-                <a:latin typeface="Arial"/>
-                <a:ea typeface="ＭＳ Ｐゴシック" charset="0"/>
-                <a:cs typeface="Arial"/>
-              </a:rPr>
-              <a:t> </a:t>
-            </a:r>
-            <a:r>
-              <a:rPr kumimoji="0" lang="fr-FR" sz="2000" b="1" i="0" u="none" strike="noStrike" kern="1200" cap="none" spc="0" normalizeH="0" baseline="0" noProof="0" dirty="0" err="1">
-                <a:ln>
-                  <a:noFill/>
-                </a:ln>
-                <a:solidFill>
-                  <a:prstClr val="black"/>
-                </a:solidFill>
-                <a:effectLst/>
-                <a:uLnTx/>
-                <a:uFillTx/>
-                <a:latin typeface="Arial"/>
-                <a:ea typeface="ＭＳ Ｐゴシック" charset="0"/>
-                <a:cs typeface="Arial"/>
-              </a:rPr>
-              <a:t>individuals</a:t>
-            </a:r>
-            <a:endParaRPr kumimoji="0" lang="fr-FR" sz="2000" b="1" i="0" u="none" strike="noStrike" kern="1200" cap="none" spc="0" normalizeH="0" baseline="0" noProof="0" dirty="0">
-              <a:ln>
-                <a:noFill/>
-              </a:ln>
-              <a:solidFill>
-                <a:prstClr val="black"/>
-              </a:solidFill>
-              <a:effectLst/>
-              <a:uLnTx/>
-              <a:uFillTx/>
-              <a:latin typeface="Arial"/>
-              <a:ea typeface="ＭＳ Ｐゴシック" charset="0"/>
-              <a:cs typeface="Arial"/>
-            </a:endParaRPr>
-          </a:p>
-          <a:p>
-            <a:pPr marL="0" marR="0" lvl="0" indent="0" algn="l" defTabSz="457200" rtl="0" eaLnBrk="1" fontAlgn="auto" latinLnBrk="0" hangingPunct="1">
-              <a:lnSpc>
-                <a:spcPct val="100000"/>
-              </a:lnSpc>
-              <a:spcBef>
-                <a:spcPts val="0"/>
-              </a:spcBef>
-              <a:spcAft>
-                <a:spcPts val="0"/>
-              </a:spcAft>
-              <a:buClrTx/>
-              <a:buSzTx/>
-              <a:buFontTx/>
-              <a:buNone/>
-              <a:tabLst/>
-              <a:defRPr/>
-            </a:pPr>
-            <a:endParaRPr kumimoji="0" lang="fr-FR" sz="2000" b="1" i="0" u="none" strike="noStrike" kern="1200" cap="none" spc="0" normalizeH="0" baseline="0" noProof="0" dirty="0">
-              <a:ln>
-                <a:noFill/>
-              </a:ln>
-              <a:solidFill>
-                <a:prstClr val="black"/>
-              </a:solidFill>
-              <a:effectLst/>
-              <a:uLnTx/>
-              <a:uFillTx/>
-              <a:latin typeface="Arial"/>
-              <a:ea typeface="ＭＳ Ｐゴシック" charset="0"/>
-              <a:cs typeface="Arial"/>
-            </a:endParaRPr>
-          </a:p>
-          <a:p>
-            <a:pPr marL="285750" marR="0" lvl="0" indent="-285750" algn="l" defTabSz="457200" rtl="0" eaLnBrk="1" fontAlgn="auto" latinLnBrk="0" hangingPunct="1">
-              <a:lnSpc>
-                <a:spcPct val="100000"/>
-              </a:lnSpc>
-              <a:spcBef>
-                <a:spcPts val="0"/>
-              </a:spcBef>
-              <a:spcAft>
-                <a:spcPts val="0"/>
-              </a:spcAft>
-              <a:buClrTx/>
-              <a:buSzTx/>
-              <a:buFontTx/>
-              <a:buChar char="-"/>
-              <a:tabLst/>
-              <a:defRPr/>
-            </a:pPr>
-            <a:r>
-              <a:rPr kumimoji="0" lang="fr-FR" sz="2000" b="1" i="0" u="none" strike="noStrike" kern="1200" cap="none" spc="0" normalizeH="0" baseline="0" noProof="0" dirty="0">
-                <a:ln>
-                  <a:noFill/>
-                </a:ln>
-                <a:solidFill>
-                  <a:prstClr val="black"/>
-                </a:solidFill>
-                <a:effectLst/>
-                <a:uLnTx/>
-                <a:uFillTx/>
-                <a:latin typeface="Arial"/>
-                <a:ea typeface="ＭＳ Ｐゴシック" charset="0"/>
-                <a:cs typeface="Arial"/>
-              </a:rPr>
-              <a:t> 5% </a:t>
-            </a:r>
-            <a:r>
-              <a:rPr kumimoji="0" lang="fr-FR" sz="2000" b="1" i="0" u="none" strike="noStrike" kern="1200" cap="none" spc="0" normalizeH="0" baseline="0" noProof="0" dirty="0" err="1">
-                <a:ln>
-                  <a:noFill/>
-                </a:ln>
-                <a:solidFill>
-                  <a:prstClr val="black"/>
-                </a:solidFill>
-                <a:effectLst/>
-                <a:uLnTx/>
-                <a:uFillTx/>
-                <a:latin typeface="Arial"/>
-                <a:ea typeface="ＭＳ Ｐゴシック" charset="0"/>
-                <a:cs typeface="Arial"/>
-              </a:rPr>
-              <a:t>will</a:t>
-            </a:r>
-            <a:r>
-              <a:rPr kumimoji="0" lang="fr-FR" sz="2000" b="1" i="0" u="none" strike="noStrike" kern="1200" cap="none" spc="0" normalizeH="0" baseline="0" noProof="0" dirty="0">
-                <a:ln>
-                  <a:noFill/>
-                </a:ln>
-                <a:solidFill>
-                  <a:prstClr val="black"/>
-                </a:solidFill>
-                <a:effectLst/>
-                <a:uLnTx/>
-                <a:uFillTx/>
-                <a:latin typeface="Arial"/>
-                <a:ea typeface="ＭＳ Ｐゴシック" charset="0"/>
-                <a:cs typeface="Arial"/>
-              </a:rPr>
-              <a:t> </a:t>
-            </a:r>
-            <a:r>
-              <a:rPr kumimoji="0" lang="fr-FR" sz="2000" b="1" i="0" u="none" strike="noStrike" kern="1200" cap="none" spc="0" normalizeH="0" baseline="0" noProof="0" dirty="0" err="1">
-                <a:ln>
-                  <a:noFill/>
-                </a:ln>
-                <a:solidFill>
-                  <a:prstClr val="black"/>
-                </a:solidFill>
-                <a:effectLst/>
-                <a:uLnTx/>
-                <a:uFillTx/>
-                <a:latin typeface="Arial"/>
-                <a:ea typeface="ＭＳ Ｐゴシック" charset="0"/>
-                <a:cs typeface="Arial"/>
-              </a:rPr>
-              <a:t>develop</a:t>
-            </a:r>
-            <a:r>
-              <a:rPr kumimoji="0" lang="fr-FR" sz="2000" b="1" i="0" u="none" strike="noStrike" kern="1200" cap="none" spc="0" normalizeH="0" baseline="0" noProof="0" dirty="0">
-                <a:ln>
-                  <a:noFill/>
-                </a:ln>
-                <a:solidFill>
-                  <a:prstClr val="black"/>
-                </a:solidFill>
-                <a:effectLst/>
-                <a:uLnTx/>
-                <a:uFillTx/>
-                <a:latin typeface="Arial"/>
-                <a:ea typeface="ＭＳ Ｐゴシック" charset="0"/>
-                <a:cs typeface="Arial"/>
-              </a:rPr>
-              <a:t> an ATL, </a:t>
-            </a:r>
-            <a:r>
-              <a:rPr kumimoji="0" lang="fr-FR" sz="2000" b="1" i="0" u="none" strike="noStrike" kern="1200" cap="none" spc="0" normalizeH="0" baseline="0" noProof="0" dirty="0" err="1">
-                <a:ln>
-                  <a:noFill/>
-                </a:ln>
-                <a:solidFill>
-                  <a:prstClr val="black"/>
-                </a:solidFill>
-                <a:effectLst/>
-                <a:uLnTx/>
-                <a:uFillTx/>
-                <a:latin typeface="Arial" charset="0"/>
-                <a:ea typeface="MS PGothic" charset="0"/>
-                <a:cs typeface="MS PGothic" charset="0"/>
-              </a:rPr>
-              <a:t>after</a:t>
-            </a:r>
-            <a:r>
-              <a:rPr kumimoji="0" lang="fr-FR" sz="2000" b="1" i="0" u="none" strike="noStrike" kern="1200" cap="none" spc="0" normalizeH="0" baseline="0" noProof="0" dirty="0">
-                <a:ln>
-                  <a:noFill/>
-                </a:ln>
-                <a:solidFill>
-                  <a:prstClr val="black"/>
-                </a:solidFill>
-                <a:effectLst/>
-                <a:uLnTx/>
-                <a:uFillTx/>
-                <a:latin typeface="Arial" charset="0"/>
-                <a:ea typeface="MS PGothic" charset="0"/>
-                <a:cs typeface="MS PGothic" charset="0"/>
-              </a:rPr>
-              <a:t> a long </a:t>
-            </a:r>
-            <a:r>
-              <a:rPr kumimoji="0" lang="fr-FR" sz="2000" b="1" i="0" u="none" strike="noStrike" kern="1200" cap="none" spc="0" normalizeH="0" baseline="0" noProof="0" dirty="0" err="1">
-                <a:ln>
-                  <a:noFill/>
-                </a:ln>
-                <a:solidFill>
-                  <a:prstClr val="black"/>
-                </a:solidFill>
-                <a:effectLst/>
-                <a:uLnTx/>
-                <a:uFillTx/>
-                <a:latin typeface="Arial" charset="0"/>
-                <a:ea typeface="MS PGothic" charset="0"/>
-                <a:cs typeface="MS PGothic" charset="0"/>
-              </a:rPr>
-              <a:t>latency</a:t>
-            </a:r>
-            <a:r>
-              <a:rPr kumimoji="0" lang="fr-FR" sz="2000" b="1" i="0" u="none" strike="noStrike" kern="1200" cap="none" spc="0" normalizeH="0" baseline="0" noProof="0" dirty="0">
-                <a:ln>
-                  <a:noFill/>
-                </a:ln>
-                <a:solidFill>
-                  <a:prstClr val="black"/>
-                </a:solidFill>
-                <a:effectLst/>
-                <a:uLnTx/>
-                <a:uFillTx/>
-                <a:latin typeface="Arial" charset="0"/>
-                <a:ea typeface="MS PGothic" charset="0"/>
-                <a:cs typeface="MS PGothic" charset="0"/>
-              </a:rPr>
-              <a:t> </a:t>
-            </a:r>
-            <a:r>
-              <a:rPr kumimoji="0" lang="fr-FR" sz="2000" b="1" i="0" u="none" strike="noStrike" kern="1200" cap="none" spc="0" normalizeH="0" baseline="0" noProof="0" dirty="0" err="1">
-                <a:ln>
-                  <a:noFill/>
-                </a:ln>
-                <a:solidFill>
-                  <a:prstClr val="black"/>
-                </a:solidFill>
-                <a:effectLst/>
-                <a:uLnTx/>
-                <a:uFillTx/>
-                <a:latin typeface="Arial" charset="0"/>
-                <a:ea typeface="MS PGothic" charset="0"/>
-                <a:cs typeface="MS PGothic" charset="0"/>
-              </a:rPr>
-              <a:t>period</a:t>
-            </a:r>
-            <a:r>
-              <a:rPr kumimoji="0" lang="fr-FR" sz="2000" b="1" i="0" u="none" strike="noStrike" kern="1200" cap="none" spc="0" normalizeH="0" baseline="0" noProof="0" dirty="0">
-                <a:ln>
-                  <a:noFill/>
-                </a:ln>
-                <a:solidFill>
-                  <a:prstClr val="black"/>
-                </a:solidFill>
-                <a:effectLst/>
-                <a:uLnTx/>
-                <a:uFillTx/>
-                <a:latin typeface="Arial" charset="0"/>
-                <a:ea typeface="MS PGothic" charset="0"/>
-                <a:cs typeface="MS PGothic" charset="0"/>
-              </a:rPr>
-              <a:t> (20 to 50 y.)</a:t>
-            </a:r>
-          </a:p>
-          <a:p>
-            <a:pPr marL="285750" marR="0" lvl="0" indent="-285750" algn="l" defTabSz="457200" rtl="0" eaLnBrk="1" fontAlgn="auto" latinLnBrk="0" hangingPunct="1">
-              <a:lnSpc>
-                <a:spcPct val="100000"/>
-              </a:lnSpc>
-              <a:spcBef>
-                <a:spcPts val="0"/>
-              </a:spcBef>
-              <a:spcAft>
-                <a:spcPts val="0"/>
-              </a:spcAft>
-              <a:buClrTx/>
-              <a:buSzTx/>
-              <a:buFontTx/>
-              <a:buChar char="-"/>
-              <a:tabLst/>
-              <a:defRPr/>
-            </a:pPr>
-            <a:endParaRPr lang="fr-FR" sz="2000" b="1" dirty="0">
-              <a:solidFill>
-                <a:prstClr val="black"/>
-              </a:solidFill>
-              <a:latin typeface="Arial" charset="0"/>
-              <a:ea typeface="MS PGothic" charset="0"/>
-              <a:cs typeface="MS PGothic" charset="0"/>
-            </a:endParaRPr>
-          </a:p>
-          <a:p>
-            <a:pPr marL="285750" indent="-285750" defTabSz="457200">
-              <a:buFontTx/>
-              <a:buChar char="-"/>
-              <a:defRPr/>
-            </a:pPr>
-            <a:r>
-              <a:rPr lang="fr-FR" sz="2000" b="1" dirty="0">
-                <a:solidFill>
-                  <a:prstClr val="black"/>
-                </a:solidFill>
-                <a:latin typeface="Arial" charset="0"/>
-                <a:cs typeface="Arial" charset="0"/>
-              </a:rPr>
-              <a:t>ATL: </a:t>
-            </a:r>
-            <a:r>
-              <a:rPr lang="fr-FR" sz="2000" b="1" dirty="0" err="1">
-                <a:solidFill>
-                  <a:prstClr val="black"/>
-                </a:solidFill>
-                <a:latin typeface="Arial" charset="0"/>
-                <a:cs typeface="Arial" charset="0"/>
-              </a:rPr>
-              <a:t>Aggressive</a:t>
-            </a:r>
-            <a:r>
-              <a:rPr lang="fr-FR" sz="2000" b="1" dirty="0">
-                <a:solidFill>
-                  <a:prstClr val="black"/>
-                </a:solidFill>
-                <a:latin typeface="Arial" charset="0"/>
-                <a:cs typeface="Arial" charset="0"/>
-              </a:rPr>
-              <a:t> </a:t>
-            </a:r>
-            <a:r>
-              <a:rPr lang="fr-FR" sz="2000" b="1" dirty="0" err="1">
-                <a:solidFill>
-                  <a:prstClr val="black"/>
-                </a:solidFill>
-                <a:latin typeface="Arial" charset="0"/>
-                <a:cs typeface="Arial" charset="0"/>
-              </a:rPr>
-              <a:t>proliferation</a:t>
-            </a:r>
-            <a:r>
-              <a:rPr lang="fr-FR" sz="2000" b="1" dirty="0">
-                <a:solidFill>
-                  <a:prstClr val="black"/>
-                </a:solidFill>
-                <a:latin typeface="Arial" charset="0"/>
-                <a:cs typeface="Arial" charset="0"/>
-              </a:rPr>
-              <a:t> of mature, </a:t>
-            </a:r>
-            <a:r>
-              <a:rPr lang="fr-FR" sz="2000" b="1" dirty="0" err="1">
-                <a:solidFill>
-                  <a:prstClr val="black"/>
-                </a:solidFill>
-                <a:latin typeface="Arial" charset="0"/>
-                <a:cs typeface="Arial" charset="0"/>
-              </a:rPr>
-              <a:t>activated</a:t>
-            </a:r>
-            <a:r>
-              <a:rPr lang="fr-FR" sz="2000" b="1" dirty="0">
-                <a:solidFill>
-                  <a:prstClr val="black"/>
-                </a:solidFill>
-                <a:latin typeface="Arial" charset="0"/>
-                <a:cs typeface="Arial" charset="0"/>
-              </a:rPr>
-              <a:t> CD4</a:t>
-            </a:r>
-            <a:r>
-              <a:rPr lang="fr-FR" sz="2000" b="1" baseline="30000" dirty="0">
-                <a:solidFill>
-                  <a:prstClr val="black"/>
-                </a:solidFill>
-                <a:latin typeface="Arial" charset="0"/>
-                <a:cs typeface="Arial" charset="0"/>
-              </a:rPr>
-              <a:t>+</a:t>
-            </a:r>
-            <a:r>
-              <a:rPr lang="fr-FR" sz="2000" b="1" dirty="0">
-                <a:solidFill>
-                  <a:prstClr val="black"/>
-                </a:solidFill>
-                <a:latin typeface="Arial" charset="0"/>
-                <a:cs typeface="Arial" charset="0"/>
-              </a:rPr>
-              <a:t>CD25</a:t>
-            </a:r>
-            <a:r>
-              <a:rPr lang="fr-FR" sz="2000" b="1" baseline="30000" dirty="0">
-                <a:solidFill>
-                  <a:prstClr val="black"/>
-                </a:solidFill>
-                <a:latin typeface="Arial" charset="0"/>
-                <a:cs typeface="Arial" charset="0"/>
-              </a:rPr>
-              <a:t>+ </a:t>
-            </a:r>
-            <a:r>
-              <a:rPr lang="fr-FR" sz="2000" b="1" dirty="0">
-                <a:solidFill>
-                  <a:prstClr val="black"/>
-                </a:solidFill>
-                <a:latin typeface="Arial" charset="0"/>
-                <a:cs typeface="Arial" charset="0"/>
-              </a:rPr>
-              <a:t>T-</a:t>
-            </a:r>
-            <a:r>
-              <a:rPr lang="fr-FR" sz="2000" b="1" dirty="0" err="1">
-                <a:solidFill>
-                  <a:prstClr val="black"/>
-                </a:solidFill>
-                <a:latin typeface="Arial" charset="0"/>
-                <a:cs typeface="Arial" charset="0"/>
-              </a:rPr>
-              <a:t>cells</a:t>
-            </a:r>
-            <a:endParaRPr lang="fr-FR" sz="2000" b="1" dirty="0">
-              <a:solidFill>
-                <a:prstClr val="black"/>
-              </a:solidFill>
-              <a:latin typeface="Arial" charset="0"/>
-              <a:cs typeface="Arial" charset="0"/>
-            </a:endParaRPr>
-          </a:p>
-          <a:p>
-            <a:pPr marR="0" lvl="0" algn="l" defTabSz="457200" rtl="0" eaLnBrk="1" fontAlgn="auto" latinLnBrk="0" hangingPunct="1">
-              <a:lnSpc>
-                <a:spcPct val="100000"/>
-              </a:lnSpc>
-              <a:spcBef>
-                <a:spcPts val="0"/>
-              </a:spcBef>
-              <a:spcAft>
-                <a:spcPts val="0"/>
-              </a:spcAft>
-              <a:buClrTx/>
-              <a:buSzTx/>
-              <a:tabLst/>
-              <a:defRPr/>
-            </a:pPr>
-            <a:endParaRPr kumimoji="0" lang="fr-FR" sz="2000" b="1" i="0" u="none" strike="noStrike" kern="1200" cap="none" spc="0" normalizeH="0" baseline="0" noProof="0" dirty="0">
-              <a:ln>
-                <a:noFill/>
-              </a:ln>
-              <a:solidFill>
-                <a:srgbClr val="FF0000"/>
-              </a:solidFill>
-              <a:effectLst/>
-              <a:uLnTx/>
-              <a:uFillTx/>
-              <a:latin typeface="Arial" charset="0"/>
-              <a:ea typeface="MS PGothic" charset="0"/>
-              <a:cs typeface="MS PGothic" charset="0"/>
-            </a:endParaRPr>
-          </a:p>
-        </p:txBody>
-      </p:sp>
-      <p:sp>
-        <p:nvSpPr>
-          <p:cNvPr id="5" name="ZoneTexte 5">
-            <a:extLst>
-              <a:ext uri="{FF2B5EF4-FFF2-40B4-BE49-F238E27FC236}">
-                <a16:creationId xmlns:a16="http://schemas.microsoft.com/office/drawing/2014/main" id="{25D3CB5D-2664-4AC5-AEF6-11B3794FB5EE}"/>
-              </a:ext>
-            </a:extLst>
-          </p:cNvPr>
-          <p:cNvSpPr txBox="1">
-            <a:spLocks noChangeArrowheads="1"/>
-          </p:cNvSpPr>
-          <p:nvPr/>
-        </p:nvSpPr>
-        <p:spPr bwMode="auto">
-          <a:xfrm>
-            <a:off x="683290" y="0"/>
-            <a:ext cx="11232370" cy="584775"/>
-          </a:xfrm>
-          <a:prstGeom prst="rect">
-            <a:avLst/>
-          </a:prstGeom>
-          <a:noFill/>
-          <a:ln>
-            <a:noFill/>
-          </a:ln>
-          <a:extLst>
-            <a:ext uri="{909E8E84-426E-40dd-AFC4-6F175D3DCCD1}">
-              <a14:hiddenFill xmlns:a14="http://schemas.microsoft.com/office/drawing/2010/main" xmlns="">
-                <a:solidFill>
-                  <a:srgbClr val="FFFFFF"/>
-                </a:solidFill>
-              </a14:hiddenFill>
-            </a:ext>
-            <a:ext uri="{91240B29-F687-4f45-9708-019B960494DF}">
-              <a14:hiddenLine xmlns:a14="http://schemas.microsoft.com/office/drawing/2010/main" xmlns="" w="9525">
-                <a:solidFill>
-                  <a:srgbClr val="000000"/>
-                </a:solidFill>
-                <a:miter lim="800000"/>
-                <a:headEnd/>
-                <a:tailEnd/>
-              </a14:hiddenLine>
-            </a:ext>
-          </a:extLst>
-        </p:spPr>
-        <p:txBody>
-          <a:bodyPr wrap="none">
-            <a:spAutoFit/>
-          </a:bodyPr>
-          <a:lstStyle>
-            <a:lvl1pPr defTabSz="457200" eaLnBrk="0" hangingPunct="0">
-              <a:defRPr sz="2400">
-                <a:solidFill>
-                  <a:schemeClr val="tx1"/>
-                </a:solidFill>
-                <a:latin typeface="Book Antiqua" charset="0"/>
-                <a:ea typeface="ＭＳ Ｐゴシック" charset="0"/>
-                <a:cs typeface="ＭＳ Ｐゴシック" charset="0"/>
-              </a:defRPr>
-            </a:lvl1pPr>
-            <a:lvl2pPr marL="742950" indent="-285750" defTabSz="457200" eaLnBrk="0" hangingPunct="0">
-              <a:defRPr sz="2400">
-                <a:solidFill>
-                  <a:schemeClr val="tx1"/>
-                </a:solidFill>
-                <a:latin typeface="Book Antiqua" charset="0"/>
-                <a:ea typeface="ＭＳ Ｐゴシック" charset="0"/>
-              </a:defRPr>
-            </a:lvl2pPr>
-            <a:lvl3pPr marL="1143000" indent="-228600" defTabSz="457200" eaLnBrk="0" hangingPunct="0">
-              <a:defRPr sz="2400">
-                <a:solidFill>
-                  <a:schemeClr val="tx1"/>
-                </a:solidFill>
-                <a:latin typeface="Book Antiqua" charset="0"/>
-                <a:ea typeface="ＭＳ Ｐゴシック" charset="0"/>
-              </a:defRPr>
-            </a:lvl3pPr>
-            <a:lvl4pPr marL="1600200" indent="-228600" defTabSz="457200" eaLnBrk="0" hangingPunct="0">
-              <a:defRPr sz="2400">
-                <a:solidFill>
-                  <a:schemeClr val="tx1"/>
-                </a:solidFill>
-                <a:latin typeface="Book Antiqua" charset="0"/>
-                <a:ea typeface="ＭＳ Ｐゴシック" charset="0"/>
-              </a:defRPr>
-            </a:lvl4pPr>
-            <a:lvl5pPr marL="2057400" indent="-228600" defTabSz="457200" eaLnBrk="0" hangingPunct="0">
-              <a:defRPr sz="2400">
-                <a:solidFill>
-                  <a:schemeClr val="tx1"/>
-                </a:solidFill>
-                <a:latin typeface="Book Antiqua" charset="0"/>
-                <a:ea typeface="ＭＳ Ｐゴシック" charset="0"/>
-              </a:defRPr>
-            </a:lvl5pPr>
-            <a:lvl6pPr marL="2514600" indent="-228600" eaLnBrk="0" fontAlgn="base" hangingPunct="0">
-              <a:spcBef>
-                <a:spcPct val="0"/>
-              </a:spcBef>
-              <a:spcAft>
-                <a:spcPct val="0"/>
-              </a:spcAft>
-              <a:defRPr sz="2400">
-                <a:solidFill>
-                  <a:schemeClr val="tx1"/>
-                </a:solidFill>
-                <a:latin typeface="Book Antiqua" charset="0"/>
-                <a:ea typeface="ＭＳ Ｐゴシック" charset="0"/>
-              </a:defRPr>
-            </a:lvl6pPr>
-            <a:lvl7pPr marL="2971800" indent="-228600" eaLnBrk="0" fontAlgn="base" hangingPunct="0">
-              <a:spcBef>
-                <a:spcPct val="0"/>
-              </a:spcBef>
-              <a:spcAft>
-                <a:spcPct val="0"/>
-              </a:spcAft>
-              <a:defRPr sz="2400">
-                <a:solidFill>
-                  <a:schemeClr val="tx1"/>
-                </a:solidFill>
-                <a:latin typeface="Book Antiqua" charset="0"/>
-                <a:ea typeface="ＭＳ Ｐゴシック" charset="0"/>
-              </a:defRPr>
-            </a:lvl7pPr>
-            <a:lvl8pPr marL="3429000" indent="-228600" eaLnBrk="0" fontAlgn="base" hangingPunct="0">
-              <a:spcBef>
-                <a:spcPct val="0"/>
-              </a:spcBef>
-              <a:spcAft>
-                <a:spcPct val="0"/>
-              </a:spcAft>
-              <a:defRPr sz="2400">
-                <a:solidFill>
-                  <a:schemeClr val="tx1"/>
-                </a:solidFill>
-                <a:latin typeface="Book Antiqua" charset="0"/>
-                <a:ea typeface="ＭＳ Ｐゴシック" charset="0"/>
-              </a:defRPr>
-            </a:lvl8pPr>
-            <a:lvl9pPr marL="3886200" indent="-228600" eaLnBrk="0" fontAlgn="base" hangingPunct="0">
-              <a:spcBef>
-                <a:spcPct val="0"/>
-              </a:spcBef>
-              <a:spcAft>
-                <a:spcPct val="0"/>
-              </a:spcAft>
-              <a:defRPr sz="2400">
-                <a:solidFill>
-                  <a:schemeClr val="tx1"/>
-                </a:solidFill>
-                <a:latin typeface="Book Antiqua" charset="0"/>
-                <a:ea typeface="ＭＳ Ｐゴシック" charset="0"/>
-              </a:defRPr>
-            </a:lvl9pPr>
-          </a:lstStyle>
-          <a:p>
-            <a:pPr marL="0" marR="0" lvl="0" indent="0" algn="l" defTabSz="457200" rtl="0" eaLnBrk="1" fontAlgn="auto" latinLnBrk="0" hangingPunct="1">
-              <a:lnSpc>
-                <a:spcPct val="100000"/>
-              </a:lnSpc>
-              <a:spcBef>
-                <a:spcPts val="0"/>
-              </a:spcBef>
-              <a:spcAft>
-                <a:spcPts val="0"/>
-              </a:spcAft>
-              <a:buClrTx/>
-              <a:buSzTx/>
-              <a:buFontTx/>
-              <a:buNone/>
-              <a:tabLst/>
-              <a:defRPr/>
-            </a:pPr>
-            <a:r>
-              <a:rPr kumimoji="0" lang="fr-FR" sz="3200" b="1" i="0" u="none" strike="noStrike" kern="1200" cap="none" spc="0" normalizeH="0" baseline="0" noProof="0" dirty="0">
-                <a:ln>
-                  <a:noFill/>
-                </a:ln>
-                <a:solidFill>
-                  <a:srgbClr val="FF0000"/>
-                </a:solidFill>
-                <a:effectLst/>
-                <a:uLnTx/>
-                <a:uFillTx/>
-                <a:latin typeface="Arial" charset="0"/>
-                <a:ea typeface="ＭＳ Ｐゴシック" charset="0"/>
-                <a:cs typeface="Arial" charset="0"/>
-              </a:rPr>
-              <a:t>HTLV-1 </a:t>
-            </a:r>
-            <a:r>
-              <a:rPr kumimoji="0" lang="fr-FR" sz="3200" b="1" i="0" u="none" strike="noStrike" kern="1200" cap="none" spc="0" normalizeH="0" baseline="0" noProof="0" dirty="0" err="1">
-                <a:ln>
-                  <a:noFill/>
-                </a:ln>
-                <a:solidFill>
-                  <a:srgbClr val="FF0000"/>
-                </a:solidFill>
-                <a:effectLst/>
-                <a:uLnTx/>
-                <a:uFillTx/>
-                <a:latin typeface="Arial" charset="0"/>
-                <a:ea typeface="ＭＳ Ｐゴシック" charset="0"/>
-                <a:cs typeface="Arial" charset="0"/>
-              </a:rPr>
-              <a:t>associated</a:t>
-            </a:r>
-            <a:r>
-              <a:rPr kumimoji="0" lang="fr-FR" sz="3200" b="1" i="0" u="none" strike="noStrike" kern="1200" cap="none" spc="0" normalizeH="0" baseline="0" noProof="0" dirty="0">
-                <a:ln>
-                  <a:noFill/>
-                </a:ln>
-                <a:solidFill>
-                  <a:srgbClr val="FF0000"/>
-                </a:solidFill>
-                <a:effectLst/>
-                <a:uLnTx/>
-                <a:uFillTx/>
-                <a:latin typeface="Arial" charset="0"/>
-                <a:ea typeface="ＭＳ Ｐゴシック" charset="0"/>
-                <a:cs typeface="Arial" charset="0"/>
-              </a:rPr>
-              <a:t> </a:t>
-            </a:r>
-            <a:r>
-              <a:rPr kumimoji="0" lang="fr-FR" sz="3200" b="1" i="0" u="none" strike="noStrike" kern="1200" cap="none" spc="0" normalizeH="0" baseline="0" noProof="0" dirty="0" err="1">
-                <a:ln>
-                  <a:noFill/>
-                </a:ln>
-                <a:solidFill>
-                  <a:srgbClr val="FF0000"/>
-                </a:solidFill>
-                <a:effectLst/>
-                <a:uLnTx/>
-                <a:uFillTx/>
-                <a:latin typeface="Arial" charset="0"/>
-                <a:ea typeface="ＭＳ Ｐゴシック" charset="0"/>
-                <a:cs typeface="Arial" charset="0"/>
-              </a:rPr>
-              <a:t>adult</a:t>
-            </a:r>
-            <a:r>
-              <a:rPr kumimoji="0" lang="fr-FR" sz="3200" b="1" i="0" u="none" strike="noStrike" kern="1200" cap="none" spc="0" normalizeH="0" baseline="0" noProof="0" dirty="0">
-                <a:ln>
-                  <a:noFill/>
-                </a:ln>
-                <a:solidFill>
-                  <a:srgbClr val="FF0000"/>
-                </a:solidFill>
-                <a:effectLst/>
-                <a:uLnTx/>
-                <a:uFillTx/>
-                <a:latin typeface="Arial" charset="0"/>
-                <a:ea typeface="ＭＳ Ｐゴシック" charset="0"/>
-                <a:cs typeface="Arial" charset="0"/>
-              </a:rPr>
-              <a:t> </a:t>
-            </a:r>
-            <a:r>
-              <a:rPr kumimoji="0" lang="fr-FR" sz="3200" b="1" i="0" u="none" strike="noStrike" kern="1200" cap="none" spc="0" normalizeH="0" baseline="0" noProof="0" dirty="0" err="1">
-                <a:ln>
-                  <a:noFill/>
-                </a:ln>
-                <a:solidFill>
-                  <a:srgbClr val="FF0000"/>
-                </a:solidFill>
-                <a:effectLst/>
-                <a:uLnTx/>
-                <a:uFillTx/>
-                <a:latin typeface="Arial" charset="0"/>
-                <a:ea typeface="ＭＳ Ｐゴシック" charset="0"/>
-                <a:cs typeface="Arial" charset="0"/>
-              </a:rPr>
-              <a:t>T</a:t>
-            </a:r>
-            <a:r>
-              <a:rPr kumimoji="0" lang="fr-FR" sz="3200" b="1" i="0" u="none" strike="noStrike" kern="1200" cap="none" spc="0" normalizeH="0" baseline="0" noProof="0" dirty="0">
-                <a:ln>
-                  <a:noFill/>
-                </a:ln>
-                <a:solidFill>
-                  <a:srgbClr val="FF0000"/>
-                </a:solidFill>
-                <a:effectLst/>
-                <a:uLnTx/>
-                <a:uFillTx/>
-                <a:latin typeface="Arial" charset="0"/>
-                <a:ea typeface="ＭＳ Ｐゴシック" charset="0"/>
-                <a:cs typeface="Arial" charset="0"/>
-              </a:rPr>
-              <a:t> </a:t>
-            </a:r>
-            <a:r>
-              <a:rPr kumimoji="0" lang="fr-FR" sz="3200" b="1" i="0" u="none" strike="noStrike" kern="1200" cap="none" spc="0" normalizeH="0" baseline="0" noProof="0" dirty="0" err="1">
-                <a:ln>
-                  <a:noFill/>
-                </a:ln>
-                <a:solidFill>
-                  <a:srgbClr val="FF0000"/>
-                </a:solidFill>
-                <a:effectLst/>
-                <a:uLnTx/>
-                <a:uFillTx/>
-                <a:latin typeface="Arial" charset="0"/>
-                <a:ea typeface="ＭＳ Ｐゴシック" charset="0"/>
-                <a:cs typeface="Arial" charset="0"/>
-              </a:rPr>
-              <a:t>cell</a:t>
-            </a:r>
-            <a:r>
-              <a:rPr kumimoji="0" lang="fr-FR" sz="3200" b="1" i="0" u="none" strike="noStrike" kern="1200" cap="none" spc="0" normalizeH="0" baseline="0" noProof="0" dirty="0">
-                <a:ln>
-                  <a:noFill/>
-                </a:ln>
-                <a:solidFill>
-                  <a:srgbClr val="FF0000"/>
-                </a:solidFill>
-                <a:effectLst/>
-                <a:uLnTx/>
-                <a:uFillTx/>
-                <a:latin typeface="Arial" charset="0"/>
-                <a:ea typeface="ＭＳ Ｐゴシック" charset="0"/>
-                <a:cs typeface="Arial" charset="0"/>
-              </a:rPr>
-              <a:t> </a:t>
-            </a:r>
-            <a:r>
-              <a:rPr kumimoji="0" lang="fr-FR" sz="3200" b="1" i="0" u="none" strike="noStrike" kern="1200" cap="none" spc="0" normalizeH="0" baseline="0" noProof="0" dirty="0" err="1">
-                <a:ln>
-                  <a:noFill/>
-                </a:ln>
-                <a:solidFill>
-                  <a:srgbClr val="FF0000"/>
-                </a:solidFill>
-                <a:effectLst/>
-                <a:uLnTx/>
-                <a:uFillTx/>
-                <a:latin typeface="Arial" charset="0"/>
-                <a:ea typeface="ＭＳ Ｐゴシック" charset="0"/>
-                <a:cs typeface="Arial" charset="0"/>
-              </a:rPr>
-              <a:t>leukemia</a:t>
-            </a:r>
-            <a:r>
-              <a:rPr kumimoji="0" lang="fr-FR" sz="3200" b="1" i="0" u="none" strike="noStrike" kern="1200" cap="none" spc="0" normalizeH="0" baseline="0" noProof="0" dirty="0">
-                <a:ln>
-                  <a:noFill/>
-                </a:ln>
-                <a:solidFill>
-                  <a:srgbClr val="FF0000"/>
-                </a:solidFill>
-                <a:effectLst/>
-                <a:uLnTx/>
-                <a:uFillTx/>
-                <a:latin typeface="Arial" charset="0"/>
-                <a:ea typeface="ＭＳ Ｐゴシック" charset="0"/>
-                <a:cs typeface="Arial" charset="0"/>
-              </a:rPr>
-              <a:t>/</a:t>
-            </a:r>
-            <a:r>
-              <a:rPr kumimoji="0" lang="fr-FR" sz="3200" b="1" i="0" u="none" strike="noStrike" kern="1200" cap="none" spc="0" normalizeH="0" baseline="0" noProof="0" dirty="0" err="1">
-                <a:ln>
-                  <a:noFill/>
-                </a:ln>
-                <a:solidFill>
-                  <a:srgbClr val="FF0000"/>
-                </a:solidFill>
-                <a:effectLst/>
-                <a:uLnTx/>
-                <a:uFillTx/>
-                <a:latin typeface="Arial" charset="0"/>
-                <a:ea typeface="ＭＳ Ｐゴシック" charset="0"/>
-                <a:cs typeface="Arial" charset="0"/>
-              </a:rPr>
-              <a:t>lymphoma</a:t>
-            </a:r>
-            <a:r>
-              <a:rPr kumimoji="0" lang="fr-FR" sz="3200" b="1" i="0" u="none" strike="noStrike" kern="1200" cap="none" spc="0" normalizeH="0" baseline="0" noProof="0" dirty="0">
-                <a:ln>
-                  <a:noFill/>
-                </a:ln>
-                <a:solidFill>
-                  <a:srgbClr val="FF0000"/>
-                </a:solidFill>
-                <a:effectLst/>
-                <a:uLnTx/>
-                <a:uFillTx/>
-                <a:latin typeface="Arial" charset="0"/>
-                <a:ea typeface="ＭＳ Ｐゴシック" charset="0"/>
-                <a:cs typeface="Arial" charset="0"/>
-              </a:rPr>
-              <a:t> (ATL)</a:t>
-            </a:r>
-          </a:p>
-        </p:txBody>
-      </p:sp>
-      <p:pic>
-        <p:nvPicPr>
-          <p:cNvPr id="6" name="Picture 5" descr="Figure1new">
-            <a:extLst>
-              <a:ext uri="{FF2B5EF4-FFF2-40B4-BE49-F238E27FC236}">
-                <a16:creationId xmlns:a16="http://schemas.microsoft.com/office/drawing/2014/main" id="{40250184-A1E9-4D02-9055-166A0E404418}"/>
-              </a:ext>
-            </a:extLst>
-          </p:cNvPr>
-          <p:cNvPicPr>
-            <a:picLocks noChangeAspect="1" noChangeArrowheads="1"/>
-          </p:cNvPicPr>
-          <p:nvPr/>
-        </p:nvPicPr>
-        <p:blipFill>
-          <a:blip r:embed="rId3" cstate="print"/>
-          <a:srcRect l="19048" t="58038" r="57843" b="8992"/>
-          <a:stretch>
-            <a:fillRect/>
-          </a:stretch>
-        </p:blipFill>
-        <p:spPr bwMode="auto">
-          <a:xfrm>
-            <a:off x="6299475" y="3786819"/>
-            <a:ext cx="2859958" cy="2489150"/>
-          </a:xfrm>
-          <a:prstGeom prst="rect">
-            <a:avLst/>
-          </a:prstGeom>
-          <a:noFill/>
-          <a:ln w="9525">
-            <a:noFill/>
-            <a:miter lim="800000"/>
-            <a:headEnd/>
-            <a:tailEnd/>
-          </a:ln>
-        </p:spPr>
-      </p:pic>
-      <p:sp>
-        <p:nvSpPr>
-          <p:cNvPr id="7" name="ZoneTexte 10">
-            <a:extLst>
-              <a:ext uri="{FF2B5EF4-FFF2-40B4-BE49-F238E27FC236}">
-                <a16:creationId xmlns:a16="http://schemas.microsoft.com/office/drawing/2014/main" id="{0D66090B-B5C4-419E-A200-64F3D0F5B5BD}"/>
-              </a:ext>
-            </a:extLst>
-          </p:cNvPr>
-          <p:cNvSpPr txBox="1">
-            <a:spLocks noChangeArrowheads="1"/>
-          </p:cNvSpPr>
-          <p:nvPr/>
-        </p:nvSpPr>
-        <p:spPr bwMode="auto">
-          <a:xfrm>
-            <a:off x="9573143" y="6259364"/>
-            <a:ext cx="2138223" cy="523220"/>
-          </a:xfrm>
-          <a:prstGeom prst="rect">
-            <a:avLst/>
-          </a:prstGeom>
-          <a:noFill/>
-          <a:ln>
-            <a:noFill/>
-          </a:ln>
-          <a:extLst>
-            <a:ext uri="{909E8E84-426E-40dd-AFC4-6F175D3DCCD1}">
-              <a14:hiddenFill xmlns:a14="http://schemas.microsoft.com/office/drawing/2010/main" xmlns="">
-                <a:solidFill>
-                  <a:srgbClr val="FFFFFF"/>
-                </a:solidFill>
-              </a14:hiddenFill>
-            </a:ext>
-            <a:ext uri="{91240B29-F687-4f45-9708-019B960494DF}">
-              <a14:hiddenLine xmlns:a14="http://schemas.microsoft.com/office/drawing/2010/main" xmlns="" w="9525">
-                <a:solidFill>
-                  <a:srgbClr val="000000"/>
-                </a:solidFill>
-                <a:miter lim="800000"/>
-                <a:headEnd/>
-                <a:tailEnd/>
-              </a14:hiddenLine>
-            </a:ext>
-          </a:extLst>
-        </p:spPr>
-        <p:txBody>
-          <a:bodyPr wrap="square">
-            <a:spAutoFit/>
-          </a:bodyPr>
-          <a:lstStyle>
-            <a:lvl1pPr eaLnBrk="0" hangingPunct="0">
-              <a:defRPr sz="2400">
-                <a:solidFill>
-                  <a:schemeClr val="tx1"/>
-                </a:solidFill>
-                <a:latin typeface="Book Antiqua" charset="0"/>
-                <a:ea typeface="ＭＳ Ｐゴシック" charset="0"/>
-                <a:cs typeface="ＭＳ Ｐゴシック" charset="0"/>
-              </a:defRPr>
-            </a:lvl1pPr>
-            <a:lvl2pPr marL="742950" indent="-285750" eaLnBrk="0" hangingPunct="0">
-              <a:defRPr sz="2400">
-                <a:solidFill>
-                  <a:schemeClr val="tx1"/>
-                </a:solidFill>
-                <a:latin typeface="Book Antiqua" charset="0"/>
-                <a:ea typeface="ＭＳ Ｐゴシック" charset="0"/>
-              </a:defRPr>
-            </a:lvl2pPr>
-            <a:lvl3pPr marL="1143000" indent="-228600" eaLnBrk="0" hangingPunct="0">
-              <a:defRPr sz="2400">
-                <a:solidFill>
-                  <a:schemeClr val="tx1"/>
-                </a:solidFill>
-                <a:latin typeface="Book Antiqua" charset="0"/>
-                <a:ea typeface="ＭＳ Ｐゴシック" charset="0"/>
-              </a:defRPr>
-            </a:lvl3pPr>
-            <a:lvl4pPr marL="1600200" indent="-228600" eaLnBrk="0" hangingPunct="0">
-              <a:defRPr sz="2400">
-                <a:solidFill>
-                  <a:schemeClr val="tx1"/>
-                </a:solidFill>
-                <a:latin typeface="Book Antiqua" charset="0"/>
-                <a:ea typeface="ＭＳ Ｐゴシック" charset="0"/>
-              </a:defRPr>
-            </a:lvl4pPr>
-            <a:lvl5pPr marL="2057400" indent="-228600" eaLnBrk="0" hangingPunct="0">
-              <a:defRPr sz="2400">
-                <a:solidFill>
-                  <a:schemeClr val="tx1"/>
-                </a:solidFill>
-                <a:latin typeface="Book Antiqua" charset="0"/>
-                <a:ea typeface="ＭＳ Ｐゴシック" charset="0"/>
-              </a:defRPr>
-            </a:lvl5pPr>
-            <a:lvl6pPr marL="2514600" indent="-228600" eaLnBrk="0" fontAlgn="base" hangingPunct="0">
-              <a:spcBef>
-                <a:spcPct val="0"/>
-              </a:spcBef>
-              <a:spcAft>
-                <a:spcPct val="0"/>
-              </a:spcAft>
-              <a:defRPr sz="2400">
-                <a:solidFill>
-                  <a:schemeClr val="tx1"/>
-                </a:solidFill>
-                <a:latin typeface="Book Antiqua" charset="0"/>
-                <a:ea typeface="ＭＳ Ｐゴシック" charset="0"/>
-              </a:defRPr>
-            </a:lvl6pPr>
-            <a:lvl7pPr marL="2971800" indent="-228600" eaLnBrk="0" fontAlgn="base" hangingPunct="0">
-              <a:spcBef>
-                <a:spcPct val="0"/>
-              </a:spcBef>
-              <a:spcAft>
-                <a:spcPct val="0"/>
-              </a:spcAft>
-              <a:defRPr sz="2400">
-                <a:solidFill>
-                  <a:schemeClr val="tx1"/>
-                </a:solidFill>
-                <a:latin typeface="Book Antiqua" charset="0"/>
-                <a:ea typeface="ＭＳ Ｐゴシック" charset="0"/>
-              </a:defRPr>
-            </a:lvl7pPr>
-            <a:lvl8pPr marL="3429000" indent="-228600" eaLnBrk="0" fontAlgn="base" hangingPunct="0">
-              <a:spcBef>
-                <a:spcPct val="0"/>
-              </a:spcBef>
-              <a:spcAft>
-                <a:spcPct val="0"/>
-              </a:spcAft>
-              <a:defRPr sz="2400">
-                <a:solidFill>
-                  <a:schemeClr val="tx1"/>
-                </a:solidFill>
-                <a:latin typeface="Book Antiqua" charset="0"/>
-                <a:ea typeface="ＭＳ Ｐゴシック" charset="0"/>
-              </a:defRPr>
-            </a:lvl8pPr>
-            <a:lvl9pPr marL="3886200" indent="-228600" eaLnBrk="0" fontAlgn="base" hangingPunct="0">
-              <a:spcBef>
-                <a:spcPct val="0"/>
-              </a:spcBef>
-              <a:spcAft>
-                <a:spcPct val="0"/>
-              </a:spcAft>
-              <a:defRPr sz="2400">
-                <a:solidFill>
-                  <a:schemeClr val="tx1"/>
-                </a:solidFill>
-                <a:latin typeface="Book Antiqua" charset="0"/>
-                <a:ea typeface="ＭＳ Ｐゴシック" charset="0"/>
-              </a:defRPr>
-            </a:lvl9pPr>
-          </a:lstStyle>
-          <a:p>
-            <a:pPr marL="0" marR="0" lvl="0" indent="0" algn="ctr" defTabSz="914400" rtl="0" eaLnBrk="1" fontAlgn="auto" latinLnBrk="0" hangingPunct="1">
-              <a:lnSpc>
-                <a:spcPct val="100000"/>
-              </a:lnSpc>
-              <a:spcBef>
-                <a:spcPts val="0"/>
-              </a:spcBef>
-              <a:spcAft>
-                <a:spcPts val="0"/>
-              </a:spcAft>
-              <a:buClrTx/>
-              <a:buSzTx/>
-              <a:buFontTx/>
-              <a:buNone/>
-              <a:tabLst/>
-              <a:defRPr/>
-            </a:pPr>
-            <a:r>
-              <a:rPr kumimoji="0" lang="fr-FR" sz="1400" b="1" i="0" u="none" strike="noStrike" kern="1200" cap="none" spc="0" normalizeH="0" baseline="0" noProof="0" dirty="0">
-                <a:ln>
-                  <a:noFill/>
-                </a:ln>
-                <a:solidFill>
-                  <a:srgbClr val="FF0000"/>
-                </a:solidFill>
-                <a:effectLst/>
-                <a:uLnTx/>
-                <a:uFillTx/>
-                <a:latin typeface="Arial" charset="0"/>
-                <a:ea typeface="ＭＳ Ｐゴシック" charset="0"/>
-                <a:cs typeface="Arial" charset="0"/>
-              </a:rPr>
-              <a:t>Poly-</a:t>
-            </a:r>
-            <a:r>
-              <a:rPr kumimoji="0" lang="fr-FR" sz="1400" b="1" i="0" u="none" strike="noStrike" kern="1200" cap="none" spc="0" normalizeH="0" baseline="0" noProof="0" dirty="0" err="1">
-                <a:ln>
-                  <a:noFill/>
-                </a:ln>
-                <a:solidFill>
-                  <a:srgbClr val="FF0000"/>
-                </a:solidFill>
-                <a:effectLst/>
-                <a:uLnTx/>
-                <a:uFillTx/>
-                <a:latin typeface="Arial" charset="0"/>
-                <a:ea typeface="ＭＳ Ｐゴシック" charset="0"/>
-                <a:cs typeface="Arial" charset="0"/>
-              </a:rPr>
-              <a:t>lobulated</a:t>
-            </a:r>
-            <a:r>
-              <a:rPr kumimoji="0" lang="fr-FR" sz="1400" b="1" i="0" u="none" strike="noStrike" kern="1200" cap="none" spc="0" normalizeH="0" baseline="0" noProof="0" dirty="0">
-                <a:ln>
-                  <a:noFill/>
-                </a:ln>
-                <a:solidFill>
-                  <a:srgbClr val="FF0000"/>
-                </a:solidFill>
-                <a:effectLst/>
-                <a:uLnTx/>
-                <a:uFillTx/>
-                <a:latin typeface="Arial" charset="0"/>
-                <a:ea typeface="ＭＳ Ｐゴシック" charset="0"/>
-                <a:cs typeface="Arial" charset="0"/>
-              </a:rPr>
-              <a:t> ‘</a:t>
-            </a:r>
-            <a:r>
-              <a:rPr kumimoji="0" lang="fr-FR" altLang="ja-JP" sz="1400" b="1" i="0" u="none" strike="noStrike" kern="1200" cap="none" spc="0" normalizeH="0" baseline="0" noProof="0" dirty="0" err="1">
-                <a:ln>
-                  <a:noFill/>
-                </a:ln>
-                <a:solidFill>
-                  <a:srgbClr val="FF0000"/>
-                </a:solidFill>
-                <a:effectLst/>
-                <a:uLnTx/>
-                <a:uFillTx/>
-                <a:latin typeface="Arial" charset="0"/>
-                <a:ea typeface="ＭＳ Ｐゴシック" charset="0"/>
-                <a:cs typeface="Arial" charset="0"/>
-              </a:rPr>
-              <a:t>flower</a:t>
-            </a:r>
-            <a:r>
-              <a:rPr kumimoji="0" lang="fr-FR" sz="1400" b="1" i="0" u="none" strike="noStrike" kern="1200" cap="none" spc="0" normalizeH="0" baseline="0" noProof="0" dirty="0">
-                <a:ln>
-                  <a:noFill/>
-                </a:ln>
-                <a:solidFill>
-                  <a:srgbClr val="FF0000"/>
-                </a:solidFill>
-                <a:effectLst/>
-                <a:uLnTx/>
-                <a:uFillTx/>
-                <a:latin typeface="Arial" charset="0"/>
-                <a:ea typeface="ＭＳ Ｐゴシック" charset="0"/>
-                <a:cs typeface="Arial" charset="0"/>
-              </a:rPr>
-              <a:t>’</a:t>
-            </a:r>
-            <a:r>
-              <a:rPr kumimoji="0" lang="fr-FR" altLang="ja-JP" sz="1400" b="1" i="0" u="none" strike="noStrike" kern="1200" cap="none" spc="0" normalizeH="0" baseline="0" noProof="0" dirty="0">
-                <a:ln>
-                  <a:noFill/>
-                </a:ln>
-                <a:solidFill>
-                  <a:srgbClr val="FF0000"/>
-                </a:solidFill>
-                <a:effectLst/>
-                <a:uLnTx/>
-                <a:uFillTx/>
-                <a:latin typeface="Arial" charset="0"/>
-                <a:ea typeface="ＭＳ Ｐゴシック" charset="0"/>
-                <a:cs typeface="Arial" charset="0"/>
-              </a:rPr>
-              <a:t> </a:t>
-            </a:r>
-            <a:r>
-              <a:rPr kumimoji="0" lang="fr-FR" altLang="ja-JP" sz="1400" b="1" i="0" u="none" strike="noStrike" kern="1200" cap="none" spc="0" normalizeH="0" baseline="0" noProof="0" dirty="0" err="1">
-                <a:ln>
-                  <a:noFill/>
-                </a:ln>
-                <a:solidFill>
-                  <a:srgbClr val="FF0000"/>
-                </a:solidFill>
-                <a:effectLst/>
-                <a:uLnTx/>
-                <a:uFillTx/>
-                <a:latin typeface="Arial" charset="0"/>
-                <a:ea typeface="ＭＳ Ｐゴシック" charset="0"/>
-                <a:cs typeface="Arial" charset="0"/>
-              </a:rPr>
-              <a:t>cells</a:t>
-            </a:r>
-            <a:endParaRPr kumimoji="0" lang="fr-FR" sz="1400" b="1" i="0" u="none" strike="noStrike" kern="1200" cap="none" spc="0" normalizeH="0" baseline="0" noProof="0" dirty="0">
-              <a:ln>
-                <a:noFill/>
-              </a:ln>
-              <a:solidFill>
-                <a:srgbClr val="FF0000"/>
-              </a:solidFill>
-              <a:effectLst/>
-              <a:uLnTx/>
-              <a:uFillTx/>
-              <a:latin typeface="Arial" charset="0"/>
-              <a:ea typeface="ＭＳ Ｐゴシック" charset="0"/>
-              <a:cs typeface="Arial" charset="0"/>
-            </a:endParaRPr>
-          </a:p>
-        </p:txBody>
-      </p:sp>
-      <p:pic>
-        <p:nvPicPr>
-          <p:cNvPr id="9" name="Picture 2" descr="An external file that holds a picture, illustration, etc.&#10;Object name is fmicb-03-00388-g002.jpg">
-            <a:extLst>
-              <a:ext uri="{FF2B5EF4-FFF2-40B4-BE49-F238E27FC236}">
-                <a16:creationId xmlns:a16="http://schemas.microsoft.com/office/drawing/2014/main" id="{E30AEC6D-802F-4832-A720-E48E4ED52808}"/>
-              </a:ext>
-            </a:extLst>
-          </p:cNvPr>
-          <p:cNvPicPr>
-            <a:picLocks noChangeAspect="1" noChangeArrowheads="1"/>
-          </p:cNvPicPr>
-          <p:nvPr/>
-        </p:nvPicPr>
-        <p:blipFill>
-          <a:blip r:embed="rId4">
-            <a:extLst>
-              <a:ext uri="{BEBA8EAE-BF5A-486C-A8C5-ECC9F3942E4B}">
-                <a14:imgProps xmlns:a14="http://schemas.microsoft.com/office/drawing/2010/main">
-                  <a14:imgLayer r:embed="rId5">
-                    <a14:imgEffect>
-                      <a14:brightnessContrast contrast="-40000"/>
-                    </a14:imgEffect>
-                  </a14:imgLayer>
-                </a14:imgProps>
-              </a:ext>
-              <a:ext uri="{28A0092B-C50C-407E-A947-70E740481C1C}">
-                <a14:useLocalDpi xmlns:a14="http://schemas.microsoft.com/office/drawing/2010/main" val="0"/>
-              </a:ext>
-            </a:extLst>
-          </a:blip>
-          <a:srcRect/>
-          <a:stretch>
-            <a:fillRect/>
-          </a:stretch>
-        </p:blipFill>
-        <p:spPr bwMode="auto">
-          <a:xfrm>
-            <a:off x="6581264" y="582030"/>
-            <a:ext cx="5373313" cy="3114651"/>
-          </a:xfrm>
-          <a:prstGeom prst="rect">
-            <a:avLst/>
-          </a:prstGeom>
-          <a:noFill/>
-          <a:ln>
-            <a:solidFill>
-              <a:schemeClr val="tx1"/>
-            </a:solidFill>
-          </a:ln>
-          <a:extLst>
-            <a:ext uri="{909E8E84-426E-40DD-AFC4-6F175D3DCCD1}">
-              <a14:hiddenFill xmlns:a14="http://schemas.microsoft.com/office/drawing/2010/main">
-                <a:solidFill>
-                  <a:srgbClr val="FFFFFF"/>
-                </a:solidFill>
-              </a14:hiddenFill>
-            </a:ext>
-          </a:extLst>
-        </p:spPr>
-      </p:pic>
-      <p:pic>
-        <p:nvPicPr>
-          <p:cNvPr id="10" name="Picture 2" descr="https://s-media-cache-ak0.pinimg.com/736x/5c/13/fe/5c13fe89ecf25ee25aeb04c06f627d9b.jpg">
-            <a:extLst>
-              <a:ext uri="{FF2B5EF4-FFF2-40B4-BE49-F238E27FC236}">
-                <a16:creationId xmlns:a16="http://schemas.microsoft.com/office/drawing/2014/main" id="{47BB514F-02F1-4CFE-B17A-0CCB7798E5D0}"/>
-              </a:ext>
-            </a:extLst>
-          </p:cNvPr>
-          <p:cNvPicPr>
-            <a:picLocks noChangeAspect="1" noChangeArrowheads="1"/>
-          </p:cNvPicPr>
-          <p:nvPr/>
-        </p:nvPicPr>
-        <p:blipFill rotWithShape="1">
-          <a:blip r:embed="rId6">
-            <a:extLst>
-              <a:ext uri="{28A0092B-C50C-407E-A947-70E740481C1C}">
-                <a14:useLocalDpi xmlns:a14="http://schemas.microsoft.com/office/drawing/2010/main" val="0"/>
-              </a:ext>
-            </a:extLst>
-          </a:blip>
-          <a:srcRect l="17062" b="22082"/>
-          <a:stretch/>
-        </p:blipFill>
-        <p:spPr bwMode="auto">
-          <a:xfrm>
-            <a:off x="9259503" y="3738538"/>
-            <a:ext cx="2695074" cy="2520826"/>
-          </a:xfrm>
-          <a:prstGeom prst="rect">
-            <a:avLst/>
-          </a:prstGeom>
-          <a:noFill/>
-          <a:extLst>
-            <a:ext uri="{909E8E84-426E-40DD-AFC4-6F175D3DCCD1}">
-              <a14:hiddenFill xmlns:a14="http://schemas.microsoft.com/office/drawing/2010/main">
-                <a:solidFill>
-                  <a:srgbClr val="FFFFFF"/>
-                </a:solidFill>
-              </a14:hiddenFill>
-            </a:ext>
-          </a:extLst>
-        </p:spPr>
-      </p:pic>
-      <p:sp>
-        <p:nvSpPr>
-          <p:cNvPr id="11" name="Rectangle 3">
-            <a:extLst>
-              <a:ext uri="{FF2B5EF4-FFF2-40B4-BE49-F238E27FC236}">
-                <a16:creationId xmlns:a16="http://schemas.microsoft.com/office/drawing/2014/main" id="{EF4AE2A5-4DCB-4B7E-B445-74CC22C81B48}"/>
-              </a:ext>
-            </a:extLst>
-          </p:cNvPr>
-          <p:cNvSpPr>
-            <a:spLocks noChangeArrowheads="1"/>
-          </p:cNvSpPr>
-          <p:nvPr/>
-        </p:nvSpPr>
-        <p:spPr bwMode="auto">
-          <a:xfrm>
-            <a:off x="854505" y="6290175"/>
-            <a:ext cx="4714875" cy="461598"/>
-          </a:xfrm>
-          <a:prstGeom prst="rect">
-            <a:avLst/>
-          </a:prstGeom>
-          <a:noFill/>
-          <a:ln>
-            <a:noFill/>
-          </a:ln>
-          <a:extLst>
-            <a:ext uri="{909E8E84-426E-40dd-AFC4-6F175D3DCCD1}">
-              <a14:hiddenFill xmlns:a14="http://schemas.microsoft.com/office/drawing/2010/main" xmlns="">
-                <a:solidFill>
-                  <a:srgbClr val="FFFFFF"/>
-                </a:solidFill>
-              </a14:hiddenFill>
-            </a:ext>
-            <a:ext uri="{91240B29-F687-4f45-9708-019B960494DF}">
-              <a14:hiddenLine xmlns:a14="http://schemas.microsoft.com/office/drawing/2010/main" xmlns="" w="9525">
-                <a:solidFill>
-                  <a:srgbClr val="000000"/>
-                </a:solidFill>
-                <a:miter lim="800000"/>
-                <a:headEnd/>
-                <a:tailEnd/>
-              </a14:hiddenLine>
-            </a:ext>
-          </a:extLst>
-        </p:spPr>
-        <p:txBody>
-          <a:bodyPr wrap="square" lIns="91370" tIns="45687" rIns="91370" bIns="45687">
-            <a:spAutoFit/>
-          </a:bodyPr>
-          <a:lstStyle/>
-          <a:p>
-            <a:pPr marL="0" marR="0" lvl="0" indent="0" algn="l" defTabSz="914400" rtl="0" eaLnBrk="1" fontAlgn="auto" latinLnBrk="0" hangingPunct="1">
-              <a:lnSpc>
-                <a:spcPct val="100000"/>
-              </a:lnSpc>
-              <a:spcBef>
-                <a:spcPts val="0"/>
-              </a:spcBef>
-              <a:spcAft>
-                <a:spcPts val="0"/>
-              </a:spcAft>
-              <a:buClrTx/>
-              <a:buSzTx/>
-              <a:buFontTx/>
-              <a:buNone/>
-              <a:tabLst/>
-              <a:defRPr/>
-            </a:pPr>
-            <a:r>
-              <a:rPr kumimoji="0" lang="de-DE" sz="1200" b="1" i="0" u="none" strike="noStrike" kern="1200" cap="none" spc="0" normalizeH="0" baseline="0" noProof="0" dirty="0">
-                <a:ln>
-                  <a:noFill/>
-                </a:ln>
-                <a:solidFill>
-                  <a:srgbClr val="8064A2">
-                    <a:lumMod val="10000"/>
-                  </a:srgbClr>
-                </a:solidFill>
-                <a:effectLst/>
-                <a:uLnTx/>
-                <a:uFillTx/>
-                <a:latin typeface="Arial" charset="0"/>
-                <a:ea typeface="ＭＳ Ｐゴシック" charset="0"/>
-                <a:cs typeface="ＭＳ Ｐゴシック" charset="0"/>
-              </a:rPr>
-              <a:t>AIL, angioimmunoblastic lymphoma; International T-cell Lymphoma Project. </a:t>
-            </a:r>
-            <a:r>
-              <a:rPr kumimoji="0" lang="de-DE" sz="1200" b="1" i="1" u="none" strike="noStrike" kern="1200" cap="none" spc="0" normalizeH="0" baseline="0" noProof="0" dirty="0">
-                <a:ln>
-                  <a:noFill/>
-                </a:ln>
-                <a:solidFill>
-                  <a:srgbClr val="8064A2">
-                    <a:lumMod val="10000"/>
-                  </a:srgbClr>
-                </a:solidFill>
-                <a:effectLst/>
-                <a:uLnTx/>
-                <a:uFillTx/>
-                <a:latin typeface="Arial" charset="0"/>
-                <a:ea typeface="ＭＳ Ｐゴシック" charset="0"/>
-                <a:cs typeface="ＭＳ Ｐゴシック" charset="0"/>
-              </a:rPr>
-              <a:t>J Clin Oncol. </a:t>
-            </a:r>
-            <a:r>
-              <a:rPr kumimoji="0" lang="de-DE" sz="1200" b="1" i="0" u="none" strike="noStrike" kern="1200" cap="none" spc="0" normalizeH="0" baseline="0" noProof="0" dirty="0">
-                <a:ln>
-                  <a:noFill/>
-                </a:ln>
-                <a:solidFill>
-                  <a:srgbClr val="8064A2">
-                    <a:lumMod val="10000"/>
-                  </a:srgbClr>
-                </a:solidFill>
-                <a:effectLst/>
-                <a:uLnTx/>
-                <a:uFillTx/>
-                <a:latin typeface="Arial" charset="0"/>
-                <a:ea typeface="ＭＳ Ｐゴシック" charset="0"/>
-                <a:cs typeface="ＭＳ Ｐゴシック" charset="0"/>
-              </a:rPr>
-              <a:t>2008;26(25):4124-4130.</a:t>
-            </a:r>
-          </a:p>
-        </p:txBody>
-      </p:sp>
-      <p:pic>
-        <p:nvPicPr>
-          <p:cNvPr id="12" name="Picture 3">
-            <a:extLst>
-              <a:ext uri="{FF2B5EF4-FFF2-40B4-BE49-F238E27FC236}">
-                <a16:creationId xmlns:a16="http://schemas.microsoft.com/office/drawing/2014/main" id="{1F6B94C3-F7A4-4079-BD8B-98B57118FF35}"/>
-              </a:ext>
-            </a:extLst>
-          </p:cNvPr>
-          <p:cNvPicPr>
-            <a:picLocks noChangeAspect="1" noChangeArrowheads="1"/>
-          </p:cNvPicPr>
-          <p:nvPr/>
-        </p:nvPicPr>
-        <p:blipFill>
-          <a:blip r:embed="rId7" cstate="print"/>
-          <a:srcRect l="2410" t="1257" r="1205" b="64567"/>
-          <a:stretch>
-            <a:fillRect/>
-          </a:stretch>
-        </p:blipFill>
-        <p:spPr bwMode="auto">
-          <a:xfrm>
-            <a:off x="416817" y="3312896"/>
-            <a:ext cx="5030958" cy="3038882"/>
-          </a:xfrm>
-          <a:prstGeom prst="rect">
-            <a:avLst/>
-          </a:prstGeom>
-          <a:noFill/>
-          <a:ln w="9525">
-            <a:noFill/>
-            <a:round/>
-            <a:headEnd/>
-            <a:tailEnd/>
-          </a:ln>
-          <a:effectLst/>
-        </p:spPr>
-      </p:pic>
-      <p:sp>
-        <p:nvSpPr>
-          <p:cNvPr id="13" name="TextBox 12">
-            <a:extLst>
-              <a:ext uri="{FF2B5EF4-FFF2-40B4-BE49-F238E27FC236}">
-                <a16:creationId xmlns:a16="http://schemas.microsoft.com/office/drawing/2014/main" id="{BF8758F9-D27C-4A9D-831D-6EB242EC2F33}"/>
-              </a:ext>
-            </a:extLst>
-          </p:cNvPr>
-          <p:cNvSpPr txBox="1"/>
-          <p:nvPr/>
-        </p:nvSpPr>
-        <p:spPr>
-          <a:xfrm>
-            <a:off x="1196083" y="2965504"/>
-            <a:ext cx="3472425" cy="400110"/>
-          </a:xfrm>
-          <a:prstGeom prst="rect">
-            <a:avLst/>
-          </a:prstGeom>
-          <a:noFill/>
-        </p:spPr>
-        <p:txBody>
-          <a:bodyPr wrap="none" rtlCol="0">
-            <a:spAutoFit/>
-          </a:bodyPr>
-          <a:lstStyle/>
-          <a:p>
-            <a:pPr marL="0" marR="0" lvl="0" indent="0" algn="l" defTabSz="914400" rtl="0" eaLnBrk="1" fontAlgn="auto" latinLnBrk="0" hangingPunct="1">
-              <a:lnSpc>
-                <a:spcPct val="100000"/>
-              </a:lnSpc>
-              <a:spcBef>
-                <a:spcPts val="0"/>
-              </a:spcBef>
-              <a:spcAft>
-                <a:spcPts val="0"/>
-              </a:spcAft>
-              <a:buClrTx/>
-              <a:buSzTx/>
-              <a:buFontTx/>
-              <a:buNone/>
-              <a:tabLst/>
-              <a:defRPr/>
-            </a:pPr>
-            <a:r>
-              <a:rPr kumimoji="0" lang="en-US" sz="2000" b="1" i="0" u="none" strike="noStrike" kern="1200" cap="none" spc="0" normalizeH="0" baseline="0" noProof="0" dirty="0">
-                <a:ln>
-                  <a:noFill/>
-                </a:ln>
-                <a:solidFill>
-                  <a:srgbClr val="071CDF"/>
-                </a:solidFill>
-                <a:effectLst/>
-                <a:uLnTx/>
-                <a:uFillTx/>
-                <a:latin typeface="Arial" pitchFamily="34" charset="0"/>
-                <a:ea typeface="+mn-ea"/>
-                <a:cs typeface="Arial" pitchFamily="34" charset="0"/>
-              </a:rPr>
-              <a:t>The worst T cell lymphoma</a:t>
-            </a:r>
-          </a:p>
-        </p:txBody>
-      </p:sp>
-      <p:sp>
-        <p:nvSpPr>
-          <p:cNvPr id="14" name="TextBox 13">
-            <a:extLst>
-              <a:ext uri="{FF2B5EF4-FFF2-40B4-BE49-F238E27FC236}">
-                <a16:creationId xmlns:a16="http://schemas.microsoft.com/office/drawing/2014/main" id="{689DF5A6-2D8C-4384-873D-E32F6812289C}"/>
-              </a:ext>
-            </a:extLst>
-          </p:cNvPr>
-          <p:cNvSpPr txBox="1"/>
-          <p:nvPr/>
-        </p:nvSpPr>
-        <p:spPr>
-          <a:xfrm rot="16200000">
-            <a:off x="-374118" y="4591499"/>
-            <a:ext cx="1846980" cy="307777"/>
-          </a:xfrm>
-          <a:prstGeom prst="rect">
-            <a:avLst/>
-          </a:prstGeom>
-          <a:solidFill>
-            <a:schemeClr val="bg1"/>
-          </a:solidFill>
-          <a:ln>
-            <a:solidFill>
-              <a:schemeClr val="bg1"/>
-            </a:solidFill>
-          </a:ln>
-        </p:spPr>
-        <p:txBody>
-          <a:bodyPr wrap="none" rtlCol="0">
-            <a:spAutoFit/>
-          </a:bodyPr>
-          <a:lstStyle/>
-          <a:p>
-            <a:pPr algn="ctr"/>
-            <a:r>
-              <a:rPr lang="en-US" sz="1400" b="1" dirty="0">
-                <a:latin typeface="Arial" panose="020B0604020202020204" pitchFamily="34" charset="0"/>
-                <a:cs typeface="Arial" panose="020B0604020202020204" pitchFamily="34" charset="0"/>
-              </a:rPr>
-              <a:t>Overall survival (%)</a:t>
-            </a:r>
-          </a:p>
-        </p:txBody>
-      </p:sp>
       <p:sp>
         <p:nvSpPr>
           <p:cNvPr id="15" name="Rectangle 14">
@@ -9003,6 +7307,15 @@
 </file>
 
 <file path=customXml/item1.xml><?xml version="1.0" encoding="utf-8"?>
+<?mso-contentType ?>
+<FormTemplates xmlns="http://schemas.microsoft.com/sharepoint/v3/contenttype/forms">
+  <Display>DocumentLibraryForm</Display>
+  <Edit>DocumentLibraryForm</Edit>
+  <New>DocumentLibraryForm</New>
+</FormTemplates>
+</file>
+
+<file path=customXml/item2.xml><?xml version="1.0" encoding="utf-8"?>
 <ct:contentTypeSchema xmlns:ct="http://schemas.microsoft.com/office/2006/metadata/contentType" xmlns:ma="http://schemas.microsoft.com/office/2006/metadata/properties/metaAttributes" ct:_="" ma:_="" ma:contentTypeName="Document" ma:contentTypeID="0x0101002F297E98CBC1F94D91B146E1518FE7ED" ma:contentTypeVersion="16" ma:contentTypeDescription="Create a new document." ma:contentTypeScope="" ma:versionID="b25d5efa305856529bfae2db50fca6b7">
   <xsd:schema xmlns:xsd="http://www.w3.org/2001/XMLSchema" xmlns:xs="http://www.w3.org/2001/XMLSchema" xmlns:p="http://schemas.microsoft.com/office/2006/metadata/properties" xmlns:ns2="e0b5dbd4-acfb-472b-b966-7f56fcd07a38" xmlns:ns3="8fc97630-28a3-402b-81e4-61cf3797a0ea" xmlns:ns4="70c67021-407d-497a-9e1b-eae3fbfd3f61" targetNamespace="http://schemas.microsoft.com/office/2006/metadata/properties" ma:root="true" ma:fieldsID="06189fcff9cceef55dd32522b606df67" ns2:_="" ns3:_="" ns4:_="">
     <xsd:import namespace="e0b5dbd4-acfb-472b-b966-7f56fcd07a38"/>
@@ -9250,16 +7563,15 @@
 </ct:contentTypeSchema>
 </file>
 
-<file path=customXml/item2.xml><?xml version="1.0" encoding="utf-8"?>
-<?mso-contentType ?>
-<FormTemplates xmlns="http://schemas.microsoft.com/sharepoint/v3/contenttype/forms">
-  <Display>DocumentLibraryForm</Display>
-  <Edit>DocumentLibraryForm</Edit>
-  <New>DocumentLibraryForm</New>
-</FormTemplates>
+<file path=customXml/itemProps1.xml><?xml version="1.0" encoding="utf-8"?>
+<ds:datastoreItem xmlns:ds="http://schemas.openxmlformats.org/officeDocument/2006/customXml" ds:itemID="{3591AC2B-C646-4090-BEF0-E863A6886F99}">
+  <ds:schemaRefs>
+    <ds:schemaRef ds:uri="http://schemas.microsoft.com/sharepoint/v3/contenttype/forms"/>
+  </ds:schemaRefs>
+</ds:datastoreItem>
 </file>
 
-<file path=customXml/itemProps1.xml><?xml version="1.0" encoding="utf-8"?>
+<file path=customXml/itemProps2.xml><?xml version="1.0" encoding="utf-8"?>
 <ds:datastoreItem xmlns:ds="http://schemas.openxmlformats.org/officeDocument/2006/customXml" ds:itemID="{F28CDEDC-1263-4C90-8474-EE2AAE92D173}">
   <ds:schemaRefs>
     <ds:schemaRef ds:uri="http://schemas.microsoft.com/office/2006/metadata/contentType"/>
@@ -9277,12 +7589,4 @@
     <ds:schemaRef ds:uri="http://schemas.microsoft.com/internal/obd"/>
   </ds:schemaRefs>
 </ds:datastoreItem>
-</file>
-
-<file path=customXml/itemProps2.xml><?xml version="1.0" encoding="utf-8"?>
-<ds:datastoreItem xmlns:ds="http://schemas.openxmlformats.org/officeDocument/2006/customXml" ds:itemID="{3591AC2B-C646-4090-BEF0-E863A6886F99}">
-  <ds:schemaRefs>
-    <ds:schemaRef ds:uri="http://schemas.microsoft.com/sharepoint/v3/contenttype/forms"/>
-  </ds:schemaRefs>
-</ds:datastoreItem>
 </file>
</xml_diff>